<commit_message>
Uploading the CS235 presentation with center stage included.
</commit_message>
<xml_diff>
--- a/Assignment #3 - Application Prototype/CS235 - Assignment #3 - Application Prototype.pptx
+++ b/Assignment #3 - Application Prototype/CS235 - Assignment #3 - Application Prototype.pptx
@@ -449,7 +449,7 @@
             <a:pPr>
               <a:defRPr/>
             </a:pPr>
-            <a:fld id="{AFD02970-29DF-46BE-B474-C9732E8D9F65}" type="slidenum">
+            <a:fld id="{D37CC2A5-4DD0-44C0-962B-3671F17DD6E5}" type="slidenum">
               <a:rPr lang="en-US"/>
               <a:pPr>
                 <a:defRPr/>
@@ -814,7 +814,7 @@
             <a:pPr>
               <a:defRPr/>
             </a:pPr>
-            <a:fld id="{ACCFF81E-FA7B-4A25-B90F-71350E233825}" type="slidenum">
+            <a:fld id="{D5A23C53-705A-491F-A9B6-108B336645CC}" type="slidenum">
               <a:rPr lang="en-US"/>
               <a:pPr>
                 <a:defRPr/>
@@ -977,7 +977,7 @@
             <a:pPr>
               <a:defRPr/>
             </a:pPr>
-            <a:fld id="{8EE0ACD3-A7BF-4845-8D5C-63EAAAD3B33D}" type="slidenum">
+            <a:fld id="{D696A8AA-6ACE-4ADB-BE5C-DDEA34821D66}" type="slidenum">
               <a:rPr lang="en-US"/>
               <a:pPr>
                 <a:defRPr/>
@@ -1254,7 +1254,7 @@
             <a:pPr>
               <a:defRPr/>
             </a:pPr>
-            <a:fld id="{DD44F672-99F3-4EBB-9C57-AC977FFB0143}" type="slidenum">
+            <a:fld id="{58075621-BF53-4438-9C8A-AF4CF31A5B41}" type="slidenum">
               <a:rPr lang="en-US"/>
               <a:pPr>
                 <a:defRPr/>
@@ -1670,7 +1670,7 @@
             <a:pPr>
               <a:defRPr/>
             </a:pPr>
-            <a:fld id="{37E65244-C22B-4A33-A977-D047A2BB8685}" type="slidenum">
+            <a:fld id="{393C07FB-2AD4-417A-BED9-9A264C103ECE}" type="slidenum">
               <a:rPr lang="en-US"/>
               <a:pPr>
                 <a:defRPr/>
@@ -1896,7 +1896,7 @@
             <a:pPr>
               <a:defRPr/>
             </a:pPr>
-            <a:fld id="{67F5D940-3B77-42E2-84BF-140A2CF6D910}" type="slidenum">
+            <a:fld id="{BD11CE9F-2AF3-4F59-A6D7-3D3804C76BF1}" type="slidenum">
               <a:rPr lang="en-US"/>
               <a:pPr>
                 <a:defRPr/>
@@ -2112,7 +2112,7 @@
           </a:bodyPr>
           <a:lstStyle>
             <a:lvl1pPr algn="ctr">
-              <a:defRPr sz="1200" b="0" dirty="0">
+              <a:defRPr sz="1200" b="0">
                 <a:solidFill>
                   <a:srgbClr val="898989"/>
                 </a:solidFill>
@@ -2165,7 +2165,7 @@
             <a:pPr>
               <a:defRPr/>
             </a:pPr>
-            <a:fld id="{56810679-B37C-45AA-8288-E6A11BFF9AEA}" type="slidenum">
+            <a:fld id="{A3A3B9AC-2D9B-4AE3-828B-D89195528FAC}" type="slidenum">
               <a:rPr lang="en-US"/>
               <a:pPr>
                 <a:defRPr/>
@@ -2181,10 +2181,10 @@
   <p:clrMap bg1="lt1" tx1="dk1" bg2="lt2" tx2="dk2" accent1="accent1" accent2="accent2" accent3="accent3" accent4="accent4" accent5="accent5" accent6="accent6" hlink="hlink" folHlink="folHlink"/>
   <p:sldLayoutIdLst>
     <p:sldLayoutId id="2147483656" r:id="rId1"/>
-    <p:sldLayoutId id="2147483655" r:id="rId2"/>
-    <p:sldLayoutId id="2147483654" r:id="rId3"/>
-    <p:sldLayoutId id="2147483653" r:id="rId4"/>
-    <p:sldLayoutId id="2147483652" r:id="rId5"/>
+    <p:sldLayoutId id="2147483652" r:id="rId2"/>
+    <p:sldLayoutId id="2147483653" r:id="rId3"/>
+    <p:sldLayoutId id="2147483654" r:id="rId4"/>
+    <p:sldLayoutId id="2147483655" r:id="rId5"/>
   </p:sldLayoutIdLst>
   <p:hf hdr="0" ftr="0" dt="0"/>
   <p:txStyles>
@@ -2600,7 +2600,7 @@
             <a:pPr>
               <a:defRPr/>
             </a:pPr>
-            <a:fld id="{09C70426-71E2-4CF1-8CA6-67AD6611952B}" type="slidenum">
+            <a:fld id="{C3E9FB87-80C4-4016-8391-313B470847DA}" type="slidenum">
               <a:rPr lang="en-US"/>
               <a:pPr>
                 <a:defRPr/>
@@ -2802,7 +2802,7 @@
             <a:pPr>
               <a:defRPr/>
             </a:pPr>
-            <a:fld id="{1DBA2665-3510-4C54-AA1F-E1239320A681}" type="slidenum">
+            <a:fld id="{9E67A228-8947-4185-8E6D-584B76A7C1A5}" type="slidenum">
               <a:rPr lang="en-US"/>
               <a:pPr>
                 <a:defRPr/>
@@ -2815,7 +2815,7 @@
       </p:sp>
       <p:sp>
         <p:nvSpPr>
-          <p:cNvPr id="4099" name="Rectangle 2"/>
+          <p:cNvPr id="9218" name="Rectangle 2"/>
           <p:cNvSpPr>
             <a:spLocks noGrp="1"/>
           </p:cNvSpPr>
@@ -2946,7 +2946,6 @@
             <a:headEnd/>
             <a:tailEnd/>
           </a:ln>
-          <a:effectLst/>
         </p:spPr>
         <p:txBody>
           <a:bodyPr>
@@ -3088,7 +3087,7 @@
       </p:grpSpPr>
       <p:sp>
         <p:nvSpPr>
-          <p:cNvPr id="38914" name="Rectangle 2"/>
+          <p:cNvPr id="10241" name="Rectangle 2"/>
           <p:cNvSpPr>
             <a:spLocks noGrp="1"/>
           </p:cNvSpPr>
@@ -3110,7 +3109,7 @@
       </p:sp>
       <p:sp>
         <p:nvSpPr>
-          <p:cNvPr id="38916" name="Rectangle 3"/>
+          <p:cNvPr id="10242" name="Rectangle 3"/>
           <p:cNvSpPr>
             <a:spLocks/>
           </p:cNvSpPr>
@@ -3255,7 +3254,6 @@
             <a:headEnd/>
             <a:tailEnd/>
           </a:ln>
-          <a:effectLst/>
         </p:spPr>
         <p:txBody>
           <a:bodyPr>
@@ -3408,7 +3406,7 @@
       </p:grpSpPr>
       <p:sp>
         <p:nvSpPr>
-          <p:cNvPr id="40962" name="Rectangle 2"/>
+          <p:cNvPr id="11265" name="Rectangle 2"/>
           <p:cNvSpPr>
             <a:spLocks noGrp="1"/>
           </p:cNvSpPr>
@@ -3430,7 +3428,7 @@
       </p:sp>
       <p:sp>
         <p:nvSpPr>
-          <p:cNvPr id="40963" name="Rectangle 3"/>
+          <p:cNvPr id="11266" name="Rectangle 3"/>
           <p:cNvSpPr>
             <a:spLocks noGrp="1"/>
           </p:cNvSpPr>
@@ -3678,7 +3676,7 @@
       </p:grpSpPr>
       <p:sp>
         <p:nvSpPr>
-          <p:cNvPr id="41986" name="Rectangle 2"/>
+          <p:cNvPr id="12289" name="Rectangle 2"/>
           <p:cNvSpPr>
             <a:spLocks noGrp="1"/>
           </p:cNvSpPr>
@@ -3700,7 +3698,7 @@
       </p:sp>
       <p:sp>
         <p:nvSpPr>
-          <p:cNvPr id="41987" name="Rectangle 3"/>
+          <p:cNvPr id="12290" name="Rectangle 3"/>
           <p:cNvSpPr>
             <a:spLocks noGrp="1"/>
           </p:cNvSpPr>
@@ -3749,7 +3747,7 @@
             <a:pPr lvl="2"/>
             <a:r>
               <a:rPr lang="en-US" smtClean="0"/>
-              <a:t>Calendar Date (courtesy of FullCalendar JQuery API)</a:t>
+              <a:t>Calendar Date (courtesy of JQuery FullCalendar API)</a:t>
             </a:r>
           </a:p>
           <a:p>
@@ -3789,8 +3787,23 @@
             </a:r>
           </a:p>
           <a:p>
+            <a:pPr lvl="1"/>
+            <a:r>
+              <a:rPr lang="en-US" b="1" smtClean="0">
+                <a:solidFill>
+                  <a:srgbClr val="003300"/>
+                </a:solidFill>
+              </a:rPr>
+              <a:t>Center Stage</a:t>
+            </a:r>
+            <a:endParaRPr lang="en-US" b="1" smtClean="0"/>
+          </a:p>
+          <a:p>
             <a:pPr lvl="2"/>
-            <a:endParaRPr lang="en-US" smtClean="0"/>
+            <a:r>
+              <a:rPr lang="en-US" smtClean="0"/>
+              <a:t>Calendar is the largest and most information dense.</a:t>
+            </a:r>
           </a:p>
         </p:txBody>
       </p:sp>

</xml_diff>